<commit_message>
Added more to poster
</commit_message>
<xml_diff>
--- a/Faculty_Excellence_Poster.pptx
+++ b/Faculty_Excellence_Poster.pptx
@@ -259,7 +259,7 @@
           <a:p>
             <a:fld id="{1B0DDBA4-3369-4357-AA90-0F6CDA7E5F31}" type="datetimeFigureOut">
               <a:rPr lang="en-US" smtClean="0"/>
-              <a:t>2/25/2025</a:t>
+              <a:t>2/27/2025</a:t>
             </a:fld>
             <a:endParaRPr lang="en-US"/>
           </a:p>
@@ -457,7 +457,7 @@
           <a:p>
             <a:fld id="{1B0DDBA4-3369-4357-AA90-0F6CDA7E5F31}" type="datetimeFigureOut">
               <a:rPr lang="en-US" smtClean="0"/>
-              <a:t>2/25/2025</a:t>
+              <a:t>2/27/2025</a:t>
             </a:fld>
             <a:endParaRPr lang="en-US"/>
           </a:p>
@@ -665,7 +665,7 @@
           <a:p>
             <a:fld id="{1B0DDBA4-3369-4357-AA90-0F6CDA7E5F31}" type="datetimeFigureOut">
               <a:rPr lang="en-US" smtClean="0"/>
-              <a:t>2/25/2025</a:t>
+              <a:t>2/27/2025</a:t>
             </a:fld>
             <a:endParaRPr lang="en-US"/>
           </a:p>
@@ -863,7 +863,7 @@
           <a:p>
             <a:fld id="{1B0DDBA4-3369-4357-AA90-0F6CDA7E5F31}" type="datetimeFigureOut">
               <a:rPr lang="en-US" smtClean="0"/>
-              <a:t>2/25/2025</a:t>
+              <a:t>2/27/2025</a:t>
             </a:fld>
             <a:endParaRPr lang="en-US"/>
           </a:p>
@@ -1138,7 +1138,7 @@
           <a:p>
             <a:fld id="{1B0DDBA4-3369-4357-AA90-0F6CDA7E5F31}" type="datetimeFigureOut">
               <a:rPr lang="en-US" smtClean="0"/>
-              <a:t>2/25/2025</a:t>
+              <a:t>2/27/2025</a:t>
             </a:fld>
             <a:endParaRPr lang="en-US"/>
           </a:p>
@@ -1403,7 +1403,7 @@
           <a:p>
             <a:fld id="{1B0DDBA4-3369-4357-AA90-0F6CDA7E5F31}" type="datetimeFigureOut">
               <a:rPr lang="en-US" smtClean="0"/>
-              <a:t>2/25/2025</a:t>
+              <a:t>2/27/2025</a:t>
             </a:fld>
             <a:endParaRPr lang="en-US"/>
           </a:p>
@@ -1815,7 +1815,7 @@
           <a:p>
             <a:fld id="{1B0DDBA4-3369-4357-AA90-0F6CDA7E5F31}" type="datetimeFigureOut">
               <a:rPr lang="en-US" smtClean="0"/>
-              <a:t>2/25/2025</a:t>
+              <a:t>2/27/2025</a:t>
             </a:fld>
             <a:endParaRPr lang="en-US"/>
           </a:p>
@@ -1956,7 +1956,7 @@
           <a:p>
             <a:fld id="{1B0DDBA4-3369-4357-AA90-0F6CDA7E5F31}" type="datetimeFigureOut">
               <a:rPr lang="en-US" smtClean="0"/>
-              <a:t>2/25/2025</a:t>
+              <a:t>2/27/2025</a:t>
             </a:fld>
             <a:endParaRPr lang="en-US"/>
           </a:p>
@@ -2069,7 +2069,7 @@
           <a:p>
             <a:fld id="{1B0DDBA4-3369-4357-AA90-0F6CDA7E5F31}" type="datetimeFigureOut">
               <a:rPr lang="en-US" smtClean="0"/>
-              <a:t>2/25/2025</a:t>
+              <a:t>2/27/2025</a:t>
             </a:fld>
             <a:endParaRPr lang="en-US"/>
           </a:p>
@@ -2380,7 +2380,7 @@
           <a:p>
             <a:fld id="{1B0DDBA4-3369-4357-AA90-0F6CDA7E5F31}" type="datetimeFigureOut">
               <a:rPr lang="en-US" smtClean="0"/>
-              <a:t>2/25/2025</a:t>
+              <a:t>2/27/2025</a:t>
             </a:fld>
             <a:endParaRPr lang="en-US"/>
           </a:p>
@@ -2668,7 +2668,7 @@
           <a:p>
             <a:fld id="{1B0DDBA4-3369-4357-AA90-0F6CDA7E5F31}" type="datetimeFigureOut">
               <a:rPr lang="en-US" smtClean="0"/>
-              <a:t>2/25/2025</a:t>
+              <a:t>2/27/2025</a:t>
             </a:fld>
             <a:endParaRPr lang="en-US"/>
           </a:p>
@@ -2909,7 +2909,7 @@
           <a:p>
             <a:fld id="{1B0DDBA4-3369-4357-AA90-0F6CDA7E5F31}" type="datetimeFigureOut">
               <a:rPr lang="en-US" smtClean="0"/>
-              <a:t>2/25/2025</a:t>
+              <a:t>2/27/2025</a:t>
             </a:fld>
             <a:endParaRPr lang="en-US"/>
           </a:p>
@@ -3533,7 +3533,7 @@
         </p:nvSpPr>
         <p:spPr>
           <a:xfrm>
-            <a:off x="4023361" y="1601292"/>
+            <a:off x="4006551" y="1564295"/>
             <a:ext cx="7674258" cy="3245028"/>
           </a:xfrm>
           <a:prstGeom prst="rect">
@@ -3867,8 +3867,8 @@
         </p:nvSpPr>
         <p:spPr>
           <a:xfrm>
-            <a:off x="4037076" y="1639454"/>
-            <a:ext cx="4959141" cy="3785652"/>
+            <a:off x="4037077" y="1639454"/>
+            <a:ext cx="2802636" cy="3046988"/>
           </a:xfrm>
           <a:prstGeom prst="rect">
             <a:avLst/>
@@ -3882,7 +3882,7 @@
           <a:lstStyle/>
           <a:p>
             <a:r>
-              <a:rPr lang="en-US" sz="1600" b="1" u="sng" dirty="0">
+              <a:rPr lang="en-US" sz="1600" b="1" i="1" u="sng" dirty="0">
                 <a:latin typeface="Helvetica" panose="020B0604020202020204"/>
                 <a:cs typeface="Helvetica" panose="020B0604020202020204"/>
               </a:rPr>
@@ -3890,10 +3890,19 @@
             </a:r>
           </a:p>
           <a:p>
-            <a:endParaRPr lang="en-US" sz="1600" b="1" u="sng" dirty="0">
+            <a:endParaRPr lang="en-US" sz="1600" i="1" dirty="0">
               <a:latin typeface="Helvetica" panose="020B0604020202020204"/>
               <a:cs typeface="Helvetica" panose="020B0604020202020204"/>
             </a:endParaRPr>
+          </a:p>
+          <a:p>
+            <a:r>
+              <a:rPr lang="en-US" sz="1600" b="1" i="1" dirty="0">
+                <a:latin typeface="Helvetica" panose="020B0604020202020204"/>
+                <a:cs typeface="Helvetica" panose="020B0604020202020204"/>
+              </a:rPr>
+              <a:t>Themes</a:t>
+            </a:r>
           </a:p>
           <a:p>
             <a:r>
@@ -3905,15 +3914,6 @@
             </a:r>
           </a:p>
           <a:p>
-            <a:r>
-              <a:rPr lang="en-US" sz="1600" dirty="0">
-                <a:latin typeface="Helvetica" panose="020B0604020202020204"/>
-                <a:cs typeface="Helvetica" panose="020B0604020202020204"/>
-              </a:rPr>
-              <a:t>Recommendation 1</a:t>
-            </a:r>
-          </a:p>
-          <a:p>
             <a:endParaRPr lang="en-US" sz="1600" dirty="0">
               <a:latin typeface="Helvetica" panose="020B0604020202020204"/>
               <a:cs typeface="Helvetica" panose="020B0604020202020204"/>
@@ -3929,15 +3929,6 @@
             </a:r>
           </a:p>
           <a:p>
-            <a:r>
-              <a:rPr lang="en-US" sz="1600" dirty="0">
-                <a:latin typeface="Helvetica" panose="020B0604020202020204"/>
-                <a:cs typeface="Helvetica" panose="020B0604020202020204"/>
-              </a:rPr>
-              <a:t>Recommendation 2</a:t>
-            </a:r>
-          </a:p>
-          <a:p>
             <a:endParaRPr lang="en-US" sz="1600" dirty="0">
               <a:latin typeface="Helvetica" panose="020B0604020202020204"/>
               <a:cs typeface="Helvetica" panose="020B0604020202020204"/>
@@ -3953,15 +3944,6 @@
             </a:r>
           </a:p>
           <a:p>
-            <a:r>
-              <a:rPr lang="en-US" sz="1600" dirty="0">
-                <a:latin typeface="Helvetica" panose="020B0604020202020204"/>
-                <a:cs typeface="Helvetica" panose="020B0604020202020204"/>
-              </a:rPr>
-              <a:t>Recommendation 3</a:t>
-            </a:r>
-          </a:p>
-          <a:p>
             <a:endParaRPr lang="en-US" sz="1600" dirty="0">
               <a:latin typeface="Helvetica" panose="020B0604020202020204"/>
               <a:cs typeface="Helvetica" panose="020B0604020202020204"/>
@@ -3977,15 +3959,6 @@
             </a:r>
           </a:p>
           <a:p>
-            <a:r>
-              <a:rPr lang="en-US" sz="1600" dirty="0">
-                <a:latin typeface="Helvetica" panose="020B0604020202020204"/>
-                <a:cs typeface="Helvetica" panose="020B0604020202020204"/>
-              </a:rPr>
-              <a:t>Rec</a:t>
-            </a:r>
-          </a:p>
-          <a:p>
             <a:endParaRPr lang="en-US" sz="1600" dirty="0">
               <a:latin typeface="Helvetica" panose="020B0604020202020204"/>
               <a:cs typeface="Helvetica" panose="020B0604020202020204"/>
@@ -4014,7 +3987,7 @@
         <p:spPr>
           <a:xfrm>
             <a:off x="4023360" y="5073858"/>
-            <a:ext cx="2596896" cy="338554"/>
+            <a:ext cx="2596896" cy="830997"/>
           </a:xfrm>
           <a:prstGeom prst="rect">
             <a:avLst/>
@@ -4034,6 +4007,155 @@
               </a:rPr>
               <a:t>Conclusion</a:t>
             </a:r>
+          </a:p>
+          <a:p>
+            <a:endParaRPr lang="en-US" sz="1600" b="1" u="sng" dirty="0">
+              <a:latin typeface="Helvetica" panose="020B0604020202020204"/>
+              <a:cs typeface="Helvetica" panose="020B0604020202020204"/>
+            </a:endParaRPr>
+          </a:p>
+          <a:p>
+            <a:endParaRPr lang="en-US" sz="1600" b="1" u="sng" dirty="0">
+              <a:latin typeface="Helvetica" panose="020B0604020202020204"/>
+              <a:cs typeface="Helvetica" panose="020B0604020202020204"/>
+            </a:endParaRPr>
+          </a:p>
+        </p:txBody>
+      </p:sp>
+      <p:sp>
+        <p:nvSpPr>
+          <p:cNvPr id="6" name="TextBox 5">
+            <a:extLst>
+              <a:ext uri="{FF2B5EF4-FFF2-40B4-BE49-F238E27FC236}">
+                <a16:creationId xmlns:a16="http://schemas.microsoft.com/office/drawing/2014/main" id="{6C420A76-05A3-8797-9BBA-B688FC130F83}"/>
+              </a:ext>
+            </a:extLst>
+          </p:cNvPr>
+          <p:cNvSpPr txBox="1"/>
+          <p:nvPr/>
+        </p:nvSpPr>
+        <p:spPr>
+          <a:xfrm>
+            <a:off x="7353994" y="2125176"/>
+            <a:ext cx="4959141" cy="3539430"/>
+          </a:xfrm>
+          <a:prstGeom prst="rect">
+            <a:avLst/>
+          </a:prstGeom>
+          <a:noFill/>
+        </p:spPr>
+        <p:txBody>
+          <a:bodyPr wrap="square" rtlCol="0">
+            <a:spAutoFit/>
+          </a:bodyPr>
+          <a:lstStyle/>
+          <a:p>
+            <a:r>
+              <a:rPr lang="en-US" sz="1600" b="1" i="1" dirty="0">
+                <a:latin typeface="Helvetica" panose="020B0604020202020204"/>
+                <a:cs typeface="Helvetica" panose="020B0604020202020204"/>
+              </a:rPr>
+              <a:t>Recommendations</a:t>
+            </a:r>
+          </a:p>
+          <a:p>
+            <a:endParaRPr lang="en-US" sz="1600" b="1" i="1" u="sng" dirty="0">
+              <a:latin typeface="Helvetica" panose="020B0604020202020204"/>
+              <a:cs typeface="Helvetica" panose="020B0604020202020204"/>
+            </a:endParaRPr>
+          </a:p>
+          <a:p>
+            <a:r>
+              <a:rPr lang="en-US" sz="1600" dirty="0">
+                <a:latin typeface="Helvetica" panose="020B0604020202020204"/>
+                <a:cs typeface="Helvetica" panose="020B0604020202020204"/>
+              </a:rPr>
+              <a:t>1. Acquire Feedback</a:t>
+            </a:r>
+          </a:p>
+          <a:p>
+            <a:r>
+              <a:rPr lang="en-US" sz="1600" dirty="0">
+                <a:latin typeface="Helvetica" panose="020B0604020202020204"/>
+                <a:cs typeface="Helvetica" panose="020B0604020202020204"/>
+              </a:rPr>
+              <a:t>2. Optimize Scheduling</a:t>
+            </a:r>
+          </a:p>
+          <a:p>
+            <a:r>
+              <a:rPr lang="en-US" sz="1600" dirty="0">
+                <a:latin typeface="Helvetica" panose="020B0604020202020204"/>
+                <a:cs typeface="Helvetica" panose="020B0604020202020204"/>
+              </a:rPr>
+              <a:t>3. Teach the why</a:t>
+            </a:r>
+          </a:p>
+          <a:p>
+            <a:r>
+              <a:rPr lang="en-US" sz="1600" dirty="0">
+                <a:latin typeface="Helvetica" panose="020B0604020202020204"/>
+                <a:cs typeface="Helvetica" panose="020B0604020202020204"/>
+              </a:rPr>
+              <a:t>4. Prepare through practice </a:t>
+            </a:r>
+          </a:p>
+          <a:p>
+            <a:r>
+              <a:rPr lang="en-US" sz="1600" dirty="0">
+                <a:latin typeface="Helvetica" panose="020B0604020202020204"/>
+                <a:cs typeface="Helvetica" panose="020B0604020202020204"/>
+              </a:rPr>
+              <a:t>5. Scaffold</a:t>
+            </a:r>
+          </a:p>
+          <a:p>
+            <a:r>
+              <a:rPr lang="en-US" sz="1600" dirty="0">
+                <a:latin typeface="Helvetica" panose="020B0604020202020204"/>
+                <a:cs typeface="Helvetica" panose="020B0604020202020204"/>
+              </a:rPr>
+              <a:t>6. Use Technology</a:t>
+            </a:r>
+          </a:p>
+          <a:p>
+            <a:r>
+              <a:rPr lang="en-US" sz="1600" dirty="0">
+                <a:latin typeface="Helvetica" panose="020B0604020202020204"/>
+                <a:cs typeface="Helvetica" panose="020B0604020202020204"/>
+              </a:rPr>
+              <a:t>7. Prepare your students</a:t>
+            </a:r>
+          </a:p>
+          <a:p>
+            <a:endParaRPr lang="en-US" sz="1600" dirty="0">
+              <a:latin typeface="Helvetica" panose="020B0604020202020204"/>
+              <a:cs typeface="Helvetica" panose="020B0604020202020204"/>
+            </a:endParaRPr>
+          </a:p>
+          <a:p>
+            <a:endParaRPr lang="en-US" sz="1600" dirty="0">
+              <a:latin typeface="Helvetica" panose="020B0604020202020204"/>
+              <a:cs typeface="Helvetica" panose="020B0604020202020204"/>
+            </a:endParaRPr>
+          </a:p>
+          <a:p>
+            <a:endParaRPr lang="en-US" sz="1600" dirty="0">
+              <a:latin typeface="Helvetica" panose="020B0604020202020204"/>
+              <a:cs typeface="Helvetica" panose="020B0604020202020204"/>
+            </a:endParaRPr>
+          </a:p>
+          <a:p>
+            <a:endParaRPr lang="en-US" sz="1600" dirty="0">
+              <a:latin typeface="Helvetica" panose="020B0604020202020204"/>
+              <a:cs typeface="Helvetica" panose="020B0604020202020204"/>
+            </a:endParaRPr>
+          </a:p>
+          <a:p>
+            <a:endParaRPr lang="en-US" sz="1600" dirty="0">
+              <a:latin typeface="Helvetica" panose="020B0604020202020204"/>
+              <a:cs typeface="Helvetica" panose="020B0604020202020204"/>
+            </a:endParaRPr>
           </a:p>
         </p:txBody>
       </p:sp>

</xml_diff>